<commit_message>
Probe endpoint for testing
</commit_message>
<xml_diff>
--- a/documents/Managing System/Deployment Diagram 2.0.pptx
+++ b/documents/Managing System/Deployment Diagram 2.0.pptx
@@ -260,7 +260,7 @@
           <a:p>
             <a:fld id="{0C022E22-8E55-0642-8631-076F0F4D5404}" type="datetimeFigureOut">
               <a:rPr lang="it-IT" smtClean="0"/>
-              <a:t>06/11/22</a:t>
+              <a:t>07/11/22</a:t>
             </a:fld>
             <a:endParaRPr lang="it-IT"/>
           </a:p>
@@ -458,7 +458,7 @@
           <a:p>
             <a:fld id="{0C022E22-8E55-0642-8631-076F0F4D5404}" type="datetimeFigureOut">
               <a:rPr lang="it-IT" smtClean="0"/>
-              <a:t>06/11/22</a:t>
+              <a:t>07/11/22</a:t>
             </a:fld>
             <a:endParaRPr lang="it-IT"/>
           </a:p>
@@ -666,7 +666,7 @@
           <a:p>
             <a:fld id="{0C022E22-8E55-0642-8631-076F0F4D5404}" type="datetimeFigureOut">
               <a:rPr lang="it-IT" smtClean="0"/>
-              <a:t>06/11/22</a:t>
+              <a:t>07/11/22</a:t>
             </a:fld>
             <a:endParaRPr lang="it-IT"/>
           </a:p>
@@ -864,7 +864,7 @@
           <a:p>
             <a:fld id="{0C022E22-8E55-0642-8631-076F0F4D5404}" type="datetimeFigureOut">
               <a:rPr lang="it-IT" smtClean="0"/>
-              <a:t>06/11/22</a:t>
+              <a:t>07/11/22</a:t>
             </a:fld>
             <a:endParaRPr lang="it-IT"/>
           </a:p>
@@ -1139,7 +1139,7 @@
           <a:p>
             <a:fld id="{0C022E22-8E55-0642-8631-076F0F4D5404}" type="datetimeFigureOut">
               <a:rPr lang="it-IT" smtClean="0"/>
-              <a:t>06/11/22</a:t>
+              <a:t>07/11/22</a:t>
             </a:fld>
             <a:endParaRPr lang="it-IT"/>
           </a:p>
@@ -1404,7 +1404,7 @@
           <a:p>
             <a:fld id="{0C022E22-8E55-0642-8631-076F0F4D5404}" type="datetimeFigureOut">
               <a:rPr lang="it-IT" smtClean="0"/>
-              <a:t>06/11/22</a:t>
+              <a:t>07/11/22</a:t>
             </a:fld>
             <a:endParaRPr lang="it-IT"/>
           </a:p>
@@ -1816,7 +1816,7 @@
           <a:p>
             <a:fld id="{0C022E22-8E55-0642-8631-076F0F4D5404}" type="datetimeFigureOut">
               <a:rPr lang="it-IT" smtClean="0"/>
-              <a:t>06/11/22</a:t>
+              <a:t>07/11/22</a:t>
             </a:fld>
             <a:endParaRPr lang="it-IT"/>
           </a:p>
@@ -1957,7 +1957,7 @@
           <a:p>
             <a:fld id="{0C022E22-8E55-0642-8631-076F0F4D5404}" type="datetimeFigureOut">
               <a:rPr lang="it-IT" smtClean="0"/>
-              <a:t>06/11/22</a:t>
+              <a:t>07/11/22</a:t>
             </a:fld>
             <a:endParaRPr lang="it-IT"/>
           </a:p>
@@ -2070,7 +2070,7 @@
           <a:p>
             <a:fld id="{0C022E22-8E55-0642-8631-076F0F4D5404}" type="datetimeFigureOut">
               <a:rPr lang="it-IT" smtClean="0"/>
-              <a:t>06/11/22</a:t>
+              <a:t>07/11/22</a:t>
             </a:fld>
             <a:endParaRPr lang="it-IT"/>
           </a:p>
@@ -2381,7 +2381,7 @@
           <a:p>
             <a:fld id="{0C022E22-8E55-0642-8631-076F0F4D5404}" type="datetimeFigureOut">
               <a:rPr lang="it-IT" smtClean="0"/>
-              <a:t>06/11/22</a:t>
+              <a:t>07/11/22</a:t>
             </a:fld>
             <a:endParaRPr lang="it-IT"/>
           </a:p>
@@ -2669,7 +2669,7 @@
           <a:p>
             <a:fld id="{0C022E22-8E55-0642-8631-076F0F4D5404}" type="datetimeFigureOut">
               <a:rPr lang="it-IT" smtClean="0"/>
-              <a:t>06/11/22</a:t>
+              <a:t>07/11/22</a:t>
             </a:fld>
             <a:endParaRPr lang="it-IT"/>
           </a:p>
@@ -2910,7 +2910,7 @@
           <a:p>
             <a:fld id="{0C022E22-8E55-0642-8631-076F0F4D5404}" type="datetimeFigureOut">
               <a:rPr lang="it-IT" smtClean="0"/>
-              <a:t>06/11/22</a:t>
+              <a:t>07/11/22</a:t>
             </a:fld>
             <a:endParaRPr lang="it-IT"/>
           </a:p>
@@ -5841,7 +5841,7 @@
         </p:nvGrpSpPr>
         <p:grpSpPr>
           <a:xfrm>
-            <a:off x="6341294" y="4061373"/>
+            <a:off x="6395724" y="4061373"/>
             <a:ext cx="1615044" cy="1372946"/>
             <a:chOff x="2602675" y="2251169"/>
             <a:chExt cx="1615044" cy="1372946"/>
@@ -5947,7 +5947,7 @@
         </p:nvGrpSpPr>
         <p:grpSpPr>
           <a:xfrm>
-            <a:off x="6341295" y="801859"/>
+            <a:off x="6395725" y="801859"/>
             <a:ext cx="1615044" cy="1372946"/>
             <a:chOff x="2602675" y="2251169"/>
             <a:chExt cx="1615044" cy="1372946"/>
@@ -6053,7 +6053,7 @@
         </p:nvGrpSpPr>
         <p:grpSpPr>
           <a:xfrm>
-            <a:off x="10253150" y="796679"/>
+            <a:off x="10307580" y="796679"/>
             <a:ext cx="1615044" cy="1372946"/>
             <a:chOff x="2620116" y="2251169"/>
             <a:chExt cx="1615044" cy="1372946"/>
@@ -6181,7 +6181,7 @@
         </p:nvGrpSpPr>
         <p:grpSpPr>
           <a:xfrm>
-            <a:off x="8507773" y="821709"/>
+            <a:off x="8562203" y="821709"/>
             <a:ext cx="1615044" cy="1372946"/>
             <a:chOff x="2602675" y="2251169"/>
             <a:chExt cx="1615044" cy="1372946"/>
@@ -6309,7 +6309,7 @@
         </p:nvGrpSpPr>
         <p:grpSpPr>
           <a:xfrm>
-            <a:off x="8507773" y="4078094"/>
+            <a:off x="8562203" y="4078094"/>
             <a:ext cx="1615044" cy="1372946"/>
             <a:chOff x="2602675" y="2251169"/>
             <a:chExt cx="1615044" cy="1372946"/>
@@ -6451,7 +6451,7 @@
         </p:blipFill>
         <p:spPr>
           <a:xfrm>
-            <a:off x="7132615" y="1693736"/>
+            <a:off x="7187045" y="1693736"/>
             <a:ext cx="853516" cy="853516"/>
           </a:xfrm>
           <a:prstGeom prst="rect">
@@ -6487,7 +6487,7 @@
         </p:blipFill>
         <p:spPr>
           <a:xfrm>
-            <a:off x="7132615" y="4949644"/>
+            <a:off x="7187045" y="4949644"/>
             <a:ext cx="853516" cy="853516"/>
           </a:xfrm>
           <a:prstGeom prst="rect">
@@ -6513,7 +6513,7 @@
         </p:nvCxnSpPr>
         <p:spPr>
           <a:xfrm flipV="1">
-            <a:off x="4886314" y="1878912"/>
+            <a:off x="4940744" y="1878912"/>
             <a:ext cx="1670715" cy="953468"/>
           </a:xfrm>
           <a:prstGeom prst="straightConnector1">
@@ -6560,7 +6560,7 @@
         </p:nvCxnSpPr>
         <p:spPr>
           <a:xfrm>
-            <a:off x="4886314" y="3565050"/>
+            <a:off x="4940744" y="3565050"/>
             <a:ext cx="1670714" cy="792217"/>
           </a:xfrm>
           <a:prstGeom prst="straightConnector1">
@@ -6603,7 +6603,7 @@
         </p:nvGrpSpPr>
         <p:grpSpPr>
           <a:xfrm>
-            <a:off x="2319987" y="4103645"/>
+            <a:off x="2374417" y="4103645"/>
             <a:ext cx="1615044" cy="1372946"/>
             <a:chOff x="2602675" y="2251169"/>
             <a:chExt cx="1615044" cy="1372946"/>
@@ -6738,7 +6738,7 @@
         </p:blipFill>
         <p:spPr>
           <a:xfrm>
-            <a:off x="-76323" y="4255231"/>
+            <a:off x="-21893" y="4255231"/>
             <a:ext cx="1119325" cy="1119325"/>
           </a:xfrm>
           <a:prstGeom prst="rect">
@@ -6774,7 +6774,7 @@
         </p:blipFill>
         <p:spPr>
           <a:xfrm>
-            <a:off x="26139" y="2728428"/>
+            <a:off x="80569" y="2728428"/>
             <a:ext cx="914400" cy="914400"/>
           </a:xfrm>
           <a:prstGeom prst="rect">
@@ -6796,7 +6796,7 @@
         </p:nvSpPr>
         <p:spPr>
           <a:xfrm>
-            <a:off x="803" y="5237256"/>
+            <a:off x="55233" y="5237256"/>
             <a:ext cx="965072" cy="307777"/>
           </a:xfrm>
           <a:prstGeom prst="rect">
@@ -6831,7 +6831,7 @@
         </p:nvSpPr>
         <p:spPr>
           <a:xfrm>
-            <a:off x="-6635" y="3635316"/>
+            <a:off x="47795" y="3635316"/>
             <a:ext cx="979948" cy="307777"/>
           </a:xfrm>
           <a:prstGeom prst="rect">
@@ -6869,7 +6869,7 @@
         </p:nvCxnSpPr>
         <p:spPr>
           <a:xfrm flipH="1">
-            <a:off x="1043002" y="4814894"/>
+            <a:off x="1097432" y="4814894"/>
             <a:ext cx="1492719" cy="0"/>
           </a:xfrm>
           <a:prstGeom prst="straightConnector1">
@@ -6909,7 +6909,7 @@
         </p:nvSpPr>
         <p:spPr>
           <a:xfrm>
-            <a:off x="1136948" y="4480214"/>
+            <a:off x="1191378" y="4480214"/>
             <a:ext cx="1231723" cy="264749"/>
           </a:xfrm>
           <a:prstGeom prst="roundRect">
@@ -6965,7 +6965,7 @@
         </p:nvSpPr>
         <p:spPr>
           <a:xfrm>
-            <a:off x="3986190" y="2832380"/>
+            <a:off x="4040620" y="2832380"/>
             <a:ext cx="1800248" cy="732670"/>
           </a:xfrm>
           <a:prstGeom prst="roundRect">
@@ -7026,7 +7026,7 @@
         </p:nvCxnSpPr>
         <p:spPr>
           <a:xfrm flipH="1" flipV="1">
-            <a:off x="940539" y="3185628"/>
+            <a:off x="994969" y="3185628"/>
             <a:ext cx="2972499" cy="13087"/>
           </a:xfrm>
           <a:prstGeom prst="straightConnector1">
@@ -7069,7 +7069,7 @@
         </p:nvCxnSpPr>
         <p:spPr>
           <a:xfrm flipV="1">
-            <a:off x="3127508" y="3198715"/>
+            <a:off x="3181938" y="3198715"/>
             <a:ext cx="785530" cy="904930"/>
           </a:xfrm>
           <a:prstGeom prst="straightConnector1">
@@ -7108,7 +7108,7 @@
         </p:nvSpPr>
         <p:spPr>
           <a:xfrm>
-            <a:off x="2702975" y="3246525"/>
+            <a:off x="2757405" y="3246525"/>
             <a:ext cx="914400" cy="248523"/>
           </a:xfrm>
           <a:prstGeom prst="roundRect">
@@ -7168,7 +7168,7 @@
         </p:nvCxnSpPr>
         <p:spPr>
           <a:xfrm flipH="1">
-            <a:off x="7148815" y="2174805"/>
+            <a:off x="7203245" y="2174805"/>
             <a:ext cx="1" cy="1886568"/>
           </a:xfrm>
           <a:prstGeom prst="line">
@@ -7214,7 +7214,7 @@
         </p:nvCxnSpPr>
         <p:spPr>
           <a:xfrm flipV="1">
-            <a:off x="7148815" y="1898543"/>
+            <a:off x="7203245" y="1898543"/>
             <a:ext cx="1574691" cy="2162830"/>
           </a:xfrm>
           <a:prstGeom prst="straightConnector1">
@@ -7260,7 +7260,7 @@
         </p:nvCxnSpPr>
         <p:spPr>
           <a:xfrm>
-            <a:off x="7148815" y="4061373"/>
+            <a:off x="7203245" y="4061373"/>
             <a:ext cx="1574691" cy="313247"/>
           </a:xfrm>
           <a:prstGeom prst="straightConnector1">
@@ -7303,7 +7303,7 @@
         </p:nvSpPr>
         <p:spPr>
           <a:xfrm>
-            <a:off x="8516238" y="2287248"/>
+            <a:off x="8570668" y="2287248"/>
             <a:ext cx="922359" cy="255639"/>
           </a:xfrm>
           <a:prstGeom prst="roundRect">
@@ -7359,7 +7359,7 @@
         </p:nvSpPr>
         <p:spPr>
           <a:xfrm>
-            <a:off x="3809875" y="614991"/>
+            <a:off x="3864305" y="614991"/>
             <a:ext cx="6312941" cy="5240543"/>
           </a:xfrm>
           <a:prstGeom prst="roundRect">
@@ -7414,7 +7414,7 @@
         </p:nvCxnSpPr>
         <p:spPr>
           <a:xfrm>
-            <a:off x="10122817" y="1501749"/>
+            <a:off x="10177247" y="1501749"/>
             <a:ext cx="328626" cy="0"/>
           </a:xfrm>
           <a:prstGeom prst="straightConnector1">
@@ -7457,7 +7457,7 @@
         </p:nvGrpSpPr>
         <p:grpSpPr>
           <a:xfrm>
-            <a:off x="10235709" y="2798893"/>
+            <a:off x="10290139" y="2798893"/>
             <a:ext cx="1615044" cy="1372946"/>
             <a:chOff x="2607932" y="2251169"/>
             <a:chExt cx="1615044" cy="1372946"/>
@@ -7576,7 +7576,7 @@
         </p:nvCxnSpPr>
         <p:spPr>
           <a:xfrm>
-            <a:off x="10122817" y="3503963"/>
+            <a:off x="10177247" y="3503963"/>
             <a:ext cx="323369" cy="0"/>
           </a:xfrm>
           <a:prstGeom prst="straightConnector1">
@@ -7623,7 +7623,7 @@
         </p:nvCxnSpPr>
         <p:spPr>
           <a:xfrm flipV="1">
-            <a:off x="11037973" y="2169625"/>
+            <a:off x="11092403" y="2169625"/>
             <a:ext cx="5257" cy="629268"/>
           </a:xfrm>
           <a:prstGeom prst="straightConnector1">
@@ -7707,7 +7707,7 @@
         </p:blipFill>
         <p:spPr bwMode="auto">
           <a:xfrm>
-            <a:off x="10533136" y="4639084"/>
+            <a:off x="10587566" y="4639084"/>
             <a:ext cx="1013135" cy="1013135"/>
           </a:xfrm>
           <a:prstGeom prst="rect">
@@ -7742,7 +7742,7 @@
         </p:nvCxnSpPr>
         <p:spPr>
           <a:xfrm flipH="1">
-            <a:off x="11546271" y="5145652"/>
+            <a:off x="11600701" y="5145652"/>
             <a:ext cx="414525" cy="0"/>
           </a:xfrm>
           <a:prstGeom prst="straightConnector1">
@@ -7787,7 +7787,7 @@
         </p:nvCxnSpPr>
         <p:spPr>
           <a:xfrm flipV="1">
-            <a:off x="11960796" y="3521041"/>
+            <a:off x="12015226" y="3521041"/>
             <a:ext cx="0" cy="1624610"/>
           </a:xfrm>
           <a:prstGeom prst="straightConnector1">
@@ -7833,7 +7833,7 @@
         </p:nvCxnSpPr>
         <p:spPr>
           <a:xfrm>
-            <a:off x="11629760" y="3521041"/>
+            <a:off x="11684190" y="3521041"/>
             <a:ext cx="331036" cy="0"/>
           </a:xfrm>
           <a:prstGeom prst="straightConnector1">
@@ -7877,7 +7877,7 @@
         </p:nvSpPr>
         <p:spPr>
           <a:xfrm>
-            <a:off x="10533135" y="5740335"/>
+            <a:off x="10587565" y="5740335"/>
             <a:ext cx="1013135" cy="440344"/>
           </a:xfrm>
           <a:prstGeom prst="roundRect">
@@ -7942,7 +7942,7 @@
         </p:nvSpPr>
         <p:spPr>
           <a:xfrm>
-            <a:off x="8096810" y="3918237"/>
+            <a:off x="8151240" y="3918237"/>
             <a:ext cx="922359" cy="255639"/>
           </a:xfrm>
           <a:prstGeom prst="roundRect">
@@ -7998,7 +7998,7 @@
         </p:nvSpPr>
         <p:spPr>
           <a:xfrm>
-            <a:off x="6133236" y="2202080"/>
+            <a:off x="6187666" y="2202080"/>
             <a:ext cx="922359" cy="255639"/>
           </a:xfrm>
           <a:prstGeom prst="roundRect">
@@ -8054,7 +8054,7 @@
         </p:nvSpPr>
         <p:spPr>
           <a:xfrm>
-            <a:off x="6133236" y="3791438"/>
+            <a:off x="6187666" y="3791438"/>
             <a:ext cx="922359" cy="255639"/>
           </a:xfrm>
           <a:prstGeom prst="roundRect">

</xml_diff>